<commit_message>
Removed unneeded css import, updated powerpoint
</commit_message>
<xml_diff>
--- a/SWE_632_Tech_Talk.pptx
+++ b/SWE_632_Tech_Talk.pptx
@@ -7,14 +7,15 @@
   <p:sldIdLst>
     <p:sldId id="256" r:id="rId2"/>
     <p:sldId id="257" r:id="rId3"/>
-    <p:sldId id="258" r:id="rId4"/>
-    <p:sldId id="259" r:id="rId5"/>
-    <p:sldId id="260" r:id="rId6"/>
-    <p:sldId id="261" r:id="rId7"/>
-    <p:sldId id="262" r:id="rId8"/>
-    <p:sldId id="263" r:id="rId9"/>
-    <p:sldId id="264" r:id="rId10"/>
-    <p:sldId id="265" r:id="rId11"/>
+    <p:sldId id="266" r:id="rId4"/>
+    <p:sldId id="258" r:id="rId5"/>
+    <p:sldId id="259" r:id="rId6"/>
+    <p:sldId id="260" r:id="rId7"/>
+    <p:sldId id="261" r:id="rId8"/>
+    <p:sldId id="262" r:id="rId9"/>
+    <p:sldId id="263" r:id="rId10"/>
+    <p:sldId id="264" r:id="rId11"/>
+    <p:sldId id="265" r:id="rId12"/>
   </p:sldIdLst>
   <p:sldSz cx="12192000" cy="6858000"/>
   <p:notesSz cx="6858000" cy="9144000"/>
@@ -268,7 +269,7 @@
           <a:p>
             <a:fld id="{5C2F51AC-1738-2043-BD99-BD04DC72ED2F}" type="datetimeFigureOut">
               <a:rPr lang="en-US" smtClean="0"/>
-              <a:t>3/11/18</a:t>
+              <a:t>3/13/18</a:t>
             </a:fld>
             <a:endParaRPr lang="en-US"/>
           </a:p>
@@ -466,7 +467,7 @@
           <a:p>
             <a:fld id="{5C2F51AC-1738-2043-BD99-BD04DC72ED2F}" type="datetimeFigureOut">
               <a:rPr lang="en-US" smtClean="0"/>
-              <a:t>3/11/18</a:t>
+              <a:t>3/13/18</a:t>
             </a:fld>
             <a:endParaRPr lang="en-US"/>
           </a:p>
@@ -674,7 +675,7 @@
           <a:p>
             <a:fld id="{5C2F51AC-1738-2043-BD99-BD04DC72ED2F}" type="datetimeFigureOut">
               <a:rPr lang="en-US" smtClean="0"/>
-              <a:t>3/11/18</a:t>
+              <a:t>3/13/18</a:t>
             </a:fld>
             <a:endParaRPr lang="en-US"/>
           </a:p>
@@ -872,7 +873,7 @@
           <a:p>
             <a:fld id="{5C2F51AC-1738-2043-BD99-BD04DC72ED2F}" type="datetimeFigureOut">
               <a:rPr lang="en-US" smtClean="0"/>
-              <a:t>3/11/18</a:t>
+              <a:t>3/13/18</a:t>
             </a:fld>
             <a:endParaRPr lang="en-US"/>
           </a:p>
@@ -1147,7 +1148,7 @@
           <a:p>
             <a:fld id="{5C2F51AC-1738-2043-BD99-BD04DC72ED2F}" type="datetimeFigureOut">
               <a:rPr lang="en-US" smtClean="0"/>
-              <a:t>3/11/18</a:t>
+              <a:t>3/13/18</a:t>
             </a:fld>
             <a:endParaRPr lang="en-US"/>
           </a:p>
@@ -1412,7 +1413,7 @@
           <a:p>
             <a:fld id="{5C2F51AC-1738-2043-BD99-BD04DC72ED2F}" type="datetimeFigureOut">
               <a:rPr lang="en-US" smtClean="0"/>
-              <a:t>3/11/18</a:t>
+              <a:t>3/13/18</a:t>
             </a:fld>
             <a:endParaRPr lang="en-US"/>
           </a:p>
@@ -1824,7 +1825,7 @@
           <a:p>
             <a:fld id="{5C2F51AC-1738-2043-BD99-BD04DC72ED2F}" type="datetimeFigureOut">
               <a:rPr lang="en-US" smtClean="0"/>
-              <a:t>3/11/18</a:t>
+              <a:t>3/13/18</a:t>
             </a:fld>
             <a:endParaRPr lang="en-US"/>
           </a:p>
@@ -1965,7 +1966,7 @@
           <a:p>
             <a:fld id="{5C2F51AC-1738-2043-BD99-BD04DC72ED2F}" type="datetimeFigureOut">
               <a:rPr lang="en-US" smtClean="0"/>
-              <a:t>3/11/18</a:t>
+              <a:t>3/13/18</a:t>
             </a:fld>
             <a:endParaRPr lang="en-US"/>
           </a:p>
@@ -2078,7 +2079,7 @@
           <a:p>
             <a:fld id="{5C2F51AC-1738-2043-BD99-BD04DC72ED2F}" type="datetimeFigureOut">
               <a:rPr lang="en-US" smtClean="0"/>
-              <a:t>3/11/18</a:t>
+              <a:t>3/13/18</a:t>
             </a:fld>
             <a:endParaRPr lang="en-US"/>
           </a:p>
@@ -2389,7 +2390,7 @@
           <a:p>
             <a:fld id="{5C2F51AC-1738-2043-BD99-BD04DC72ED2F}" type="datetimeFigureOut">
               <a:rPr lang="en-US" smtClean="0"/>
-              <a:t>3/11/18</a:t>
+              <a:t>3/13/18</a:t>
             </a:fld>
             <a:endParaRPr lang="en-US"/>
           </a:p>
@@ -2677,7 +2678,7 @@
           <a:p>
             <a:fld id="{5C2F51AC-1738-2043-BD99-BD04DC72ED2F}" type="datetimeFigureOut">
               <a:rPr lang="en-US" smtClean="0"/>
-              <a:t>3/11/18</a:t>
+              <a:t>3/13/18</a:t>
             </a:fld>
             <a:endParaRPr lang="en-US"/>
           </a:p>
@@ -2918,7 +2919,7 @@
           <a:p>
             <a:fld id="{5C2F51AC-1738-2043-BD99-BD04DC72ED2F}" type="datetimeFigureOut">
               <a:rPr lang="en-US" smtClean="0"/>
-              <a:t>3/11/18</a:t>
+              <a:t>3/13/18</a:t>
             </a:fld>
             <a:endParaRPr lang="en-US"/>
           </a:p>
@@ -3432,6 +3433,98 @@
           <p:cNvPr id="2" name="Title 1">
             <a:extLst>
               <a:ext uri="{FF2B5EF4-FFF2-40B4-BE49-F238E27FC236}">
+                <a16:creationId xmlns:a16="http://schemas.microsoft.com/office/drawing/2014/main" id="{2107DA4C-FA60-814D-9141-D8A5FE2EA7A5}"/>
+              </a:ext>
+            </a:extLst>
+          </p:cNvPr>
+          <p:cNvSpPr>
+            <a:spLocks noGrp="1"/>
+          </p:cNvSpPr>
+          <p:nvPr>
+            <p:ph type="title"/>
+          </p:nvPr>
+        </p:nvSpPr>
+        <p:spPr/>
+        <p:txBody>
+          <a:bodyPr/>
+          <a:lstStyle/>
+          <a:p>
+            <a:r>
+              <a:rPr lang="en-US" dirty="0"/>
+              <a:t>Comparison to other frameworks</a:t>
+            </a:r>
+          </a:p>
+        </p:txBody>
+      </p:sp>
+      <p:sp>
+        <p:nvSpPr>
+          <p:cNvPr id="3" name="Content Placeholder 2">
+            <a:extLst>
+              <a:ext uri="{FF2B5EF4-FFF2-40B4-BE49-F238E27FC236}">
+                <a16:creationId xmlns:a16="http://schemas.microsoft.com/office/drawing/2014/main" id="{8E3D9D20-23C0-AD40-8387-9132987B5A0D}"/>
+              </a:ext>
+            </a:extLst>
+          </p:cNvPr>
+          <p:cNvSpPr>
+            <a:spLocks noGrp="1"/>
+          </p:cNvSpPr>
+          <p:nvPr>
+            <p:ph idx="1"/>
+          </p:nvPr>
+        </p:nvSpPr>
+        <p:spPr/>
+        <p:txBody>
+          <a:bodyPr/>
+          <a:lstStyle/>
+          <a:p>
+            <a:r>
+              <a:rPr lang="en-US" dirty="0"/>
+              <a:t>Competes with: Bootstrap, Foundation, Cascade, Materialize</a:t>
+            </a:r>
+          </a:p>
+          <a:p>
+            <a:endParaRPr lang="en-US" dirty="0"/>
+          </a:p>
+          <a:p>
+            <a:endParaRPr lang="en-US" dirty="0"/>
+          </a:p>
+        </p:txBody>
+      </p:sp>
+    </p:spTree>
+    <p:extLst>
+      <p:ext uri="{BB962C8B-B14F-4D97-AF65-F5344CB8AC3E}">
+        <p14:creationId xmlns:p14="http://schemas.microsoft.com/office/powerpoint/2010/main" val="487972692"/>
+      </p:ext>
+    </p:extLst>
+  </p:cSld>
+  <p:clrMapOvr>
+    <a:masterClrMapping/>
+  </p:clrMapOvr>
+</p:sld>
+</file>
+
+<file path=ppt/slides/slide11.xml><?xml version="1.0" encoding="utf-8"?>
+<p:sld xmlns:a="http://schemas.openxmlformats.org/drawingml/2006/main" xmlns:r="http://schemas.openxmlformats.org/officeDocument/2006/relationships" xmlns:p="http://schemas.openxmlformats.org/presentationml/2006/main">
+  <p:cSld>
+    <p:spTree>
+      <p:nvGrpSpPr>
+        <p:cNvPr id="1" name=""/>
+        <p:cNvGrpSpPr/>
+        <p:nvPr/>
+      </p:nvGrpSpPr>
+      <p:grpSpPr>
+        <a:xfrm>
+          <a:off x="0" y="0"/>
+          <a:ext cx="0" cy="0"/>
+          <a:chOff x="0" y="0"/>
+          <a:chExt cx="0" cy="0"/>
+        </a:xfrm>
+      </p:grpSpPr>
+      <p:sp>
+        <p:nvSpPr>
+          <p:cNvPr id="2" name="Title 1">
+            <a:extLst>
+              <a:ext uri="{FF2B5EF4-FFF2-40B4-BE49-F238E27FC236}">
                 <a16:creationId xmlns:a16="http://schemas.microsoft.com/office/drawing/2014/main" id="{26A81BBF-6FA6-2548-9AB0-2294C54AA705}"/>
               </a:ext>
             </a:extLst>
@@ -3516,6 +3609,31 @@
               </a:rPr>
               <a:t>http://blog.purecss.io/</a:t>
             </a:r>
+            <a:endParaRPr lang="en-US" dirty="0"/>
+          </a:p>
+          <a:p>
+            <a:r>
+              <a:rPr lang="en-US" dirty="0"/>
+              <a:t>SMACSS info: </a:t>
+            </a:r>
+            <a:r>
+              <a:rPr lang="en-US" dirty="0">
+                <a:hlinkClick r:id="rId5"/>
+              </a:rPr>
+              <a:t>https://smacss.com</a:t>
+            </a:r>
+            <a:r>
+              <a:rPr lang="en-US">
+                <a:hlinkClick r:id="rId5"/>
+              </a:rPr>
+              <a:t>/</a:t>
+            </a:r>
+            <a:endParaRPr lang="en-US"/>
+          </a:p>
+          <a:p>
+            <a:pPr marL="0" indent="0">
+              <a:buNone/>
+            </a:pPr>
             <a:endParaRPr lang="en-US" dirty="0"/>
           </a:p>
           <a:p>
@@ -3717,7 +3835,7 @@
           <p:cNvPr id="2" name="Title 1">
             <a:extLst>
               <a:ext uri="{FF2B5EF4-FFF2-40B4-BE49-F238E27FC236}">
-                <a16:creationId xmlns:a16="http://schemas.microsoft.com/office/drawing/2014/main" id="{FC13A0CC-3266-8A4D-84C0-01CD149821D1}"/>
+                <a16:creationId xmlns:a16="http://schemas.microsoft.com/office/drawing/2014/main" id="{EB08D3B5-14CD-3B47-8E50-2A2BEAFA128F}"/>
               </a:ext>
             </a:extLst>
           </p:cNvPr>
@@ -3735,7 +3853,7 @@
           <a:p>
             <a:r>
               <a:rPr lang="en-US" dirty="0"/>
-              <a:t>Grids</a:t>
+              <a:t>SMACSS</a:t>
             </a:r>
           </a:p>
         </p:txBody>
@@ -3745,7 +3863,7 @@
           <p:cNvPr id="3" name="Content Placeholder 2">
             <a:extLst>
               <a:ext uri="{FF2B5EF4-FFF2-40B4-BE49-F238E27FC236}">
-                <a16:creationId xmlns:a16="http://schemas.microsoft.com/office/drawing/2014/main" id="{A1621560-55AB-744A-91E9-93F91A64EF39}"/>
+                <a16:creationId xmlns:a16="http://schemas.microsoft.com/office/drawing/2014/main" id="{3517BAD1-D04D-3C45-A9B9-C2CD5241AA54}"/>
               </a:ext>
             </a:extLst>
           </p:cNvPr>
@@ -3759,167 +3877,82 @@
         <p:spPr/>
         <p:txBody>
           <a:bodyPr>
-            <a:normAutofit lnSpcReduction="10000"/>
+            <a:normAutofit/>
           </a:bodyPr>
           <a:lstStyle/>
           <a:p>
             <a:r>
               <a:rPr lang="en-US" dirty="0"/>
-              <a:t>Classes: </a:t>
-            </a:r>
-            <a:r>
-              <a:rPr lang="en-US" sz="2400" dirty="0">
-                <a:latin typeface="Consolas" panose="020B0609020204030204" pitchFamily="49" charset="0"/>
-                <a:cs typeface="Consolas" panose="020B0609020204030204" pitchFamily="49" charset="0"/>
-              </a:rPr>
-              <a:t>pure-g, pure-u-*</a:t>
-            </a:r>
-          </a:p>
-          <a:p>
-            <a:r>
-              <a:rPr lang="en-US" dirty="0"/>
-              <a:t>5ths-based and 24ths-based grids</a:t>
-            </a:r>
-          </a:p>
-          <a:p>
-            <a:r>
-              <a:rPr lang="en-US" dirty="0"/>
-              <a:t>Responsive, mobile-first grids</a:t>
-            </a:r>
-          </a:p>
-          <a:p>
-            <a:r>
-              <a:rPr lang="en-US" dirty="0"/>
-              <a:t>Units are fractions, i.e. thirds, fifths, etc.</a:t>
-            </a:r>
-          </a:p>
-          <a:p>
-            <a:r>
-              <a:rPr lang="en-US" dirty="0"/>
-              <a:t>Default media queries:</a:t>
+              <a:t>Scalable and Modular Architecture for CSS</a:t>
             </a:r>
           </a:p>
           <a:p>
             <a:pPr lvl="1"/>
             <a:r>
               <a:rPr lang="en-US" dirty="0"/>
-              <a:t>Small: </a:t>
-            </a:r>
-            <a:r>
-              <a:rPr lang="en-US" dirty="0">
-                <a:latin typeface="Consolas" panose="020B0609020204030204" pitchFamily="49" charset="0"/>
-                <a:cs typeface="Consolas" panose="020B0609020204030204" pitchFamily="49" charset="0"/>
-              </a:rPr>
-              <a:t>pure-u-</a:t>
-            </a:r>
-            <a:r>
-              <a:rPr lang="en-US" dirty="0" err="1">
-                <a:latin typeface="Consolas" panose="020B0609020204030204" pitchFamily="49" charset="0"/>
-                <a:cs typeface="Consolas" panose="020B0609020204030204" pitchFamily="49" charset="0"/>
-              </a:rPr>
-              <a:t>sm</a:t>
-            </a:r>
-            <a:r>
-              <a:rPr lang="en-US" dirty="0">
-                <a:latin typeface="Consolas" panose="020B0609020204030204" pitchFamily="49" charset="0"/>
-                <a:cs typeface="Consolas" panose="020B0609020204030204" pitchFamily="49" charset="0"/>
-              </a:rPr>
-              <a:t>-* </a:t>
-            </a:r>
-            <a:r>
-              <a:rPr lang="en-US" dirty="0"/>
-              <a:t>≥ 568px </a:t>
+              <a:t>Base Rules</a:t>
             </a:r>
           </a:p>
           <a:p>
             <a:pPr lvl="1"/>
             <a:r>
               <a:rPr lang="en-US" dirty="0"/>
-              <a:t>Medium: </a:t>
-            </a:r>
-            <a:r>
-              <a:rPr lang="en-US" dirty="0">
-                <a:latin typeface="Consolas" panose="020B0609020204030204" pitchFamily="49" charset="0"/>
-                <a:cs typeface="Consolas" panose="020B0609020204030204" pitchFamily="49" charset="0"/>
-              </a:rPr>
-              <a:t>pure-u-md-* </a:t>
-            </a:r>
-            <a:r>
-              <a:rPr lang="en-US" dirty="0"/>
-              <a:t>≥ 768px</a:t>
+              <a:t>Layout Rules</a:t>
             </a:r>
           </a:p>
           <a:p>
             <a:pPr lvl="1"/>
             <a:r>
               <a:rPr lang="en-US" dirty="0"/>
-              <a:t>Large: </a:t>
-            </a:r>
-            <a:r>
-              <a:rPr lang="en-US" dirty="0">
-                <a:latin typeface="Consolas" panose="020B0609020204030204" pitchFamily="49" charset="0"/>
-                <a:cs typeface="Consolas" panose="020B0609020204030204" pitchFamily="49" charset="0"/>
-              </a:rPr>
-              <a:t>pure-u-</a:t>
-            </a:r>
-            <a:r>
-              <a:rPr lang="en-US" dirty="0" err="1">
-                <a:latin typeface="Consolas" panose="020B0609020204030204" pitchFamily="49" charset="0"/>
-                <a:cs typeface="Consolas" panose="020B0609020204030204" pitchFamily="49" charset="0"/>
-              </a:rPr>
-              <a:t>lg</a:t>
-            </a:r>
-            <a:r>
-              <a:rPr lang="en-US" dirty="0">
-                <a:latin typeface="Consolas" panose="020B0609020204030204" pitchFamily="49" charset="0"/>
-                <a:cs typeface="Consolas" panose="020B0609020204030204" pitchFamily="49" charset="0"/>
-              </a:rPr>
-              <a:t>-* </a:t>
-            </a:r>
-            <a:r>
-              <a:rPr lang="en-US" dirty="0"/>
-              <a:t>≥ 1024px</a:t>
+              <a:t>Module Rules</a:t>
             </a:r>
           </a:p>
           <a:p>
             <a:pPr lvl="1"/>
             <a:r>
               <a:rPr lang="en-US" dirty="0"/>
-              <a:t>Extra Large: </a:t>
-            </a:r>
-            <a:r>
-              <a:rPr lang="en-US" dirty="0">
-                <a:latin typeface="Consolas" panose="020B0609020204030204" pitchFamily="49" charset="0"/>
-                <a:cs typeface="Consolas" panose="020B0609020204030204" pitchFamily="49" charset="0"/>
-              </a:rPr>
-              <a:t>pure-u-xl-* </a:t>
-            </a:r>
-            <a:r>
-              <a:rPr lang="en-US" dirty="0"/>
-              <a:t>≥ 1280px</a:t>
-            </a:r>
-          </a:p>
-          <a:p>
-            <a:r>
-              <a:rPr lang="en-US" dirty="0"/>
-              <a:t>Customizable media queries</a:t>
-            </a:r>
-          </a:p>
-          <a:p>
-            <a:pPr marL="0" indent="0">
-              <a:buNone/>
-            </a:pPr>
-            <a:endParaRPr lang="en-US" dirty="0"/>
-          </a:p>
-          <a:p>
-            <a:endParaRPr lang="en-US" dirty="0"/>
+              <a:t>State Rules</a:t>
+            </a:r>
+          </a:p>
+          <a:p>
+            <a:pPr lvl="1"/>
+            <a:r>
+              <a:rPr lang="en-US" dirty="0"/>
+              <a:t>Theme Rules</a:t>
+            </a:r>
+          </a:p>
+          <a:p>
+            <a:r>
+              <a:rPr lang="en-US" dirty="0"/>
+              <a:t>Pure Base Rules: </a:t>
+            </a:r>
+            <a:r>
+              <a:rPr lang="en-US" dirty="0" err="1"/>
+              <a:t>Normalize.css</a:t>
+            </a:r>
+            <a:r>
+              <a:rPr lang="en-US" dirty="0"/>
+              <a:t> – CSS reset</a:t>
+            </a:r>
+          </a:p>
+          <a:p>
+            <a:r>
+              <a:rPr lang="en-US" dirty="0"/>
+              <a:t>Pure Layout Rules: Grid</a:t>
+            </a:r>
+          </a:p>
+          <a:p>
+            <a:r>
+              <a:rPr lang="en-US" dirty="0"/>
+              <a:t>Pure Module Rules: Forms, Buttons, Tables, Menus</a:t>
+            </a:r>
           </a:p>
         </p:txBody>
       </p:sp>
     </p:spTree>
     <p:extLst>
       <p:ext uri="{BB962C8B-B14F-4D97-AF65-F5344CB8AC3E}">
-        <p14:creationId xmlns:p14="http://schemas.microsoft.com/office/powerpoint/2010/main" val="1037686022"/>
+        <p14:creationId xmlns:p14="http://schemas.microsoft.com/office/powerpoint/2010/main" val="2209903663"/>
       </p:ext>
     </p:extLst>
   </p:cSld>
@@ -3951,7 +3984,7 @@
           <p:cNvPr id="2" name="Title 1">
             <a:extLst>
               <a:ext uri="{FF2B5EF4-FFF2-40B4-BE49-F238E27FC236}">
-                <a16:creationId xmlns:a16="http://schemas.microsoft.com/office/drawing/2014/main" id="{98C91ED6-D288-8846-8722-99BEDCA15A40}"/>
+                <a16:creationId xmlns:a16="http://schemas.microsoft.com/office/drawing/2014/main" id="{FC13A0CC-3266-8A4D-84C0-01CD149821D1}"/>
               </a:ext>
             </a:extLst>
           </p:cNvPr>
@@ -3969,7 +4002,7 @@
           <a:p>
             <a:r>
               <a:rPr lang="en-US" dirty="0"/>
-              <a:t>Forms</a:t>
+              <a:t>Grids</a:t>
             </a:r>
           </a:p>
         </p:txBody>
@@ -3979,7 +4012,7 @@
           <p:cNvPr id="3" name="Content Placeholder 2">
             <a:extLst>
               <a:ext uri="{FF2B5EF4-FFF2-40B4-BE49-F238E27FC236}">
-                <a16:creationId xmlns:a16="http://schemas.microsoft.com/office/drawing/2014/main" id="{67F659D4-5B3E-F14F-844F-08CF4A03F689}"/>
+                <a16:creationId xmlns:a16="http://schemas.microsoft.com/office/drawing/2014/main" id="{A1621560-55AB-744A-91E9-93F91A64EF39}"/>
               </a:ext>
             </a:extLst>
           </p:cNvPr>
@@ -3992,168 +4025,168 @@
         </p:nvSpPr>
         <p:spPr/>
         <p:txBody>
-          <a:bodyPr/>
-          <a:lstStyle/>
-          <a:p>
-            <a:r>
-              <a:rPr lang="en-US" dirty="0"/>
-              <a:t>Default forms: </a:t>
-            </a:r>
-            <a:r>
-              <a:rPr lang="en-US" sz="2400" dirty="0" err="1">
-                <a:latin typeface="Consolas" panose="020B0609020204030204" pitchFamily="49" charset="0"/>
-                <a:cs typeface="Consolas" panose="020B0609020204030204" pitchFamily="49" charset="0"/>
-              </a:rPr>
-              <a:t>form.pure</a:t>
+          <a:bodyPr>
+            <a:normAutofit lnSpcReduction="10000"/>
+          </a:bodyPr>
+          <a:lstStyle/>
+          <a:p>
+            <a:r>
+              <a:rPr lang="en-US" dirty="0"/>
+              <a:t>Classes: </a:t>
             </a:r>
             <a:r>
               <a:rPr lang="en-US" sz="2400" dirty="0">
                 <a:latin typeface="Consolas" panose="020B0609020204030204" pitchFamily="49" charset="0"/>
                 <a:cs typeface="Consolas" panose="020B0609020204030204" pitchFamily="49" charset="0"/>
               </a:rPr>
-              <a:t>-form</a:t>
-            </a:r>
-          </a:p>
-          <a:p>
-            <a:r>
-              <a:rPr lang="en-US" dirty="0"/>
-              <a:t>Stacked: </a:t>
-            </a:r>
-            <a:r>
-              <a:rPr lang="en-US" sz="2400" dirty="0" err="1">
-                <a:latin typeface="Consolas" panose="020B0609020204030204" pitchFamily="49" charset="0"/>
-                <a:cs typeface="Consolas" panose="020B0609020204030204" pitchFamily="49" charset="0"/>
-              </a:rPr>
-              <a:t>form.pure</a:t>
-            </a:r>
-            <a:r>
-              <a:rPr lang="en-US" sz="2400" dirty="0">
-                <a:latin typeface="Consolas" panose="020B0609020204030204" pitchFamily="49" charset="0"/>
-                <a:cs typeface="Consolas" panose="020B0609020204030204" pitchFamily="49" charset="0"/>
-              </a:rPr>
-              <a:t>-</a:t>
-            </a:r>
-            <a:r>
-              <a:rPr lang="en-US" sz="2400" dirty="0" err="1">
-                <a:latin typeface="Consolas" panose="020B0609020204030204" pitchFamily="49" charset="0"/>
-                <a:cs typeface="Consolas" panose="020B0609020204030204" pitchFamily="49" charset="0"/>
-              </a:rPr>
-              <a:t>form.pure</a:t>
-            </a:r>
-            <a:r>
-              <a:rPr lang="en-US" sz="2400" dirty="0">
-                <a:latin typeface="Consolas" panose="020B0609020204030204" pitchFamily="49" charset="0"/>
-                <a:cs typeface="Consolas" panose="020B0609020204030204" pitchFamily="49" charset="0"/>
-              </a:rPr>
-              <a:t>-form-stacked</a:t>
-            </a:r>
-          </a:p>
-          <a:p>
-            <a:r>
-              <a:rPr lang="en-US" dirty="0"/>
-              <a:t>Aligned: </a:t>
-            </a:r>
-            <a:r>
-              <a:rPr lang="en-US" sz="2400" dirty="0" err="1">
-                <a:latin typeface="Consolas" panose="020B0609020204030204" pitchFamily="49" charset="0"/>
-                <a:cs typeface="Consolas" panose="020B0609020204030204" pitchFamily="49" charset="0"/>
-              </a:rPr>
-              <a:t>form.pure</a:t>
-            </a:r>
-            <a:r>
-              <a:rPr lang="en-US" sz="2400" dirty="0">
-                <a:latin typeface="Consolas" panose="020B0609020204030204" pitchFamily="49" charset="0"/>
-                <a:cs typeface="Consolas" panose="020B0609020204030204" pitchFamily="49" charset="0"/>
-              </a:rPr>
-              <a:t>-</a:t>
-            </a:r>
-            <a:r>
-              <a:rPr lang="en-US" sz="2400" dirty="0" err="1">
-                <a:latin typeface="Consolas" panose="020B0609020204030204" pitchFamily="49" charset="0"/>
-                <a:cs typeface="Consolas" panose="020B0609020204030204" pitchFamily="49" charset="0"/>
-              </a:rPr>
-              <a:t>form.pure</a:t>
-            </a:r>
-            <a:r>
-              <a:rPr lang="en-US" sz="2400" dirty="0">
-                <a:latin typeface="Consolas" panose="020B0609020204030204" pitchFamily="49" charset="0"/>
-                <a:cs typeface="Consolas" panose="020B0609020204030204" pitchFamily="49" charset="0"/>
-              </a:rPr>
-              <a:t>-form-aligned, pure-control-group</a:t>
-            </a:r>
-          </a:p>
-          <a:p>
-            <a:r>
-              <a:rPr lang="en-US" dirty="0"/>
-              <a:t>Grouped inputs: </a:t>
-            </a:r>
-            <a:r>
-              <a:rPr lang="en-US" sz="2400" dirty="0" err="1">
-                <a:latin typeface="Consolas" panose="020B0609020204030204" pitchFamily="49" charset="0"/>
-                <a:cs typeface="Consolas" panose="020B0609020204030204" pitchFamily="49" charset="0"/>
-              </a:rPr>
-              <a:t>fieldset.pure</a:t>
-            </a:r>
-            <a:r>
-              <a:rPr lang="en-US" sz="2400" dirty="0">
-                <a:latin typeface="Consolas" panose="020B0609020204030204" pitchFamily="49" charset="0"/>
-                <a:cs typeface="Consolas" panose="020B0609020204030204" pitchFamily="49" charset="0"/>
-              </a:rPr>
-              <a:t>-group</a:t>
-            </a:r>
-          </a:p>
-          <a:p>
-            <a:r>
-              <a:rPr lang="en-US" dirty="0"/>
-              <a:t>Size inputs: </a:t>
-            </a:r>
-            <a:r>
-              <a:rPr lang="en-US" sz="2400" dirty="0" err="1">
-                <a:latin typeface="Consolas" panose="020B0609020204030204" pitchFamily="49" charset="0"/>
-                <a:cs typeface="Consolas" panose="020B0609020204030204" pitchFamily="49" charset="0"/>
-              </a:rPr>
-              <a:t>input.pure</a:t>
-            </a:r>
-            <a:r>
-              <a:rPr lang="en-US" sz="2400" dirty="0">
-                <a:latin typeface="Consolas" panose="020B0609020204030204" pitchFamily="49" charset="0"/>
-                <a:cs typeface="Consolas" panose="020B0609020204030204" pitchFamily="49" charset="0"/>
-              </a:rPr>
-              <a:t>-input-*</a:t>
-            </a:r>
-          </a:p>
-          <a:p>
-            <a:r>
-              <a:rPr lang="en-US" dirty="0"/>
-              <a:t>Required: add the required attribute to the element</a:t>
-            </a:r>
-          </a:p>
-          <a:p>
-            <a:r>
-              <a:rPr lang="en-US" dirty="0"/>
-              <a:t>Disabled: add the disabled attribute to the element</a:t>
-            </a:r>
-          </a:p>
-          <a:p>
-            <a:r>
-              <a:rPr lang="en-US" dirty="0"/>
-              <a:t>Read-only: add the </a:t>
-            </a:r>
-            <a:r>
-              <a:rPr lang="en-US" dirty="0" err="1"/>
-              <a:t>readonly</a:t>
-            </a:r>
-            <a:r>
-              <a:rPr lang="en-US" dirty="0"/>
-              <a:t> attribute to the element</a:t>
-            </a:r>
+              <a:t>pure-g, pure-u-*</a:t>
+            </a:r>
+          </a:p>
+          <a:p>
+            <a:r>
+              <a:rPr lang="en-US" dirty="0"/>
+              <a:t>5ths-based and 24ths-based grids</a:t>
+            </a:r>
+          </a:p>
+          <a:p>
+            <a:r>
+              <a:rPr lang="en-US" dirty="0"/>
+              <a:t>Responsive, mobile-first grids</a:t>
+            </a:r>
+          </a:p>
+          <a:p>
+            <a:r>
+              <a:rPr lang="en-US" dirty="0"/>
+              <a:t>Units are fractions, i.e. thirds, fifths, etc.</a:t>
+            </a:r>
+          </a:p>
+          <a:p>
+            <a:r>
+              <a:rPr lang="en-US" dirty="0"/>
+              <a:t>Default media queries:</a:t>
+            </a:r>
+          </a:p>
+          <a:p>
+            <a:pPr lvl="1"/>
+            <a:r>
+              <a:rPr lang="en-US" dirty="0"/>
+              <a:t>Small: </a:t>
+            </a:r>
+            <a:r>
+              <a:rPr lang="en-US" dirty="0">
+                <a:latin typeface="Consolas" panose="020B0609020204030204" pitchFamily="49" charset="0"/>
+                <a:cs typeface="Consolas" panose="020B0609020204030204" pitchFamily="49" charset="0"/>
+              </a:rPr>
+              <a:t>pure-u-</a:t>
+            </a:r>
+            <a:r>
+              <a:rPr lang="en-US" dirty="0" err="1">
+                <a:latin typeface="Consolas" panose="020B0609020204030204" pitchFamily="49" charset="0"/>
+                <a:cs typeface="Consolas" panose="020B0609020204030204" pitchFamily="49" charset="0"/>
+              </a:rPr>
+              <a:t>sm</a:t>
+            </a:r>
+            <a:r>
+              <a:rPr lang="en-US" dirty="0">
+                <a:latin typeface="Consolas" panose="020B0609020204030204" pitchFamily="49" charset="0"/>
+                <a:cs typeface="Consolas" panose="020B0609020204030204" pitchFamily="49" charset="0"/>
+              </a:rPr>
+              <a:t>-* </a:t>
+            </a:r>
+            <a:r>
+              <a:rPr lang="en-US" dirty="0"/>
+              <a:t>≥ 568px </a:t>
+            </a:r>
+          </a:p>
+          <a:p>
+            <a:pPr lvl="1"/>
+            <a:r>
+              <a:rPr lang="en-US" dirty="0"/>
+              <a:t>Medium: </a:t>
+            </a:r>
+            <a:r>
+              <a:rPr lang="en-US" dirty="0">
+                <a:latin typeface="Consolas" panose="020B0609020204030204" pitchFamily="49" charset="0"/>
+                <a:cs typeface="Consolas" panose="020B0609020204030204" pitchFamily="49" charset="0"/>
+              </a:rPr>
+              <a:t>pure-u-md-* </a:t>
+            </a:r>
+            <a:r>
+              <a:rPr lang="en-US" dirty="0"/>
+              <a:t>≥ 768px</a:t>
+            </a:r>
+          </a:p>
+          <a:p>
+            <a:pPr lvl="1"/>
+            <a:r>
+              <a:rPr lang="en-US" dirty="0"/>
+              <a:t>Large: </a:t>
+            </a:r>
+            <a:r>
+              <a:rPr lang="en-US" dirty="0">
+                <a:latin typeface="Consolas" panose="020B0609020204030204" pitchFamily="49" charset="0"/>
+                <a:cs typeface="Consolas" panose="020B0609020204030204" pitchFamily="49" charset="0"/>
+              </a:rPr>
+              <a:t>pure-u-</a:t>
+            </a:r>
+            <a:r>
+              <a:rPr lang="en-US" dirty="0" err="1">
+                <a:latin typeface="Consolas" panose="020B0609020204030204" pitchFamily="49" charset="0"/>
+                <a:cs typeface="Consolas" panose="020B0609020204030204" pitchFamily="49" charset="0"/>
+              </a:rPr>
+              <a:t>lg</a:t>
+            </a:r>
+            <a:r>
+              <a:rPr lang="en-US" dirty="0">
+                <a:latin typeface="Consolas" panose="020B0609020204030204" pitchFamily="49" charset="0"/>
+                <a:cs typeface="Consolas" panose="020B0609020204030204" pitchFamily="49" charset="0"/>
+              </a:rPr>
+              <a:t>-* </a:t>
+            </a:r>
+            <a:r>
+              <a:rPr lang="en-US" dirty="0"/>
+              <a:t>≥ 1024px</a:t>
+            </a:r>
+          </a:p>
+          <a:p>
+            <a:pPr lvl="1"/>
+            <a:r>
+              <a:rPr lang="en-US" dirty="0"/>
+              <a:t>Extra Large: </a:t>
+            </a:r>
+            <a:r>
+              <a:rPr lang="en-US" dirty="0">
+                <a:latin typeface="Consolas" panose="020B0609020204030204" pitchFamily="49" charset="0"/>
+                <a:cs typeface="Consolas" panose="020B0609020204030204" pitchFamily="49" charset="0"/>
+              </a:rPr>
+              <a:t>pure-u-xl-* </a:t>
+            </a:r>
+            <a:r>
+              <a:rPr lang="en-US" dirty="0"/>
+              <a:t>≥ 1280px</a:t>
+            </a:r>
+          </a:p>
+          <a:p>
+            <a:r>
+              <a:rPr lang="en-US" dirty="0"/>
+              <a:t>Customizable media queries</a:t>
+            </a:r>
+          </a:p>
+          <a:p>
+            <a:pPr marL="0" indent="0">
+              <a:buNone/>
+            </a:pPr>
+            <a:endParaRPr lang="en-US" dirty="0"/>
+          </a:p>
+          <a:p>
+            <a:endParaRPr lang="en-US" dirty="0"/>
           </a:p>
         </p:txBody>
       </p:sp>
     </p:spTree>
     <p:extLst>
       <p:ext uri="{BB962C8B-B14F-4D97-AF65-F5344CB8AC3E}">
-        <p14:creationId xmlns:p14="http://schemas.microsoft.com/office/powerpoint/2010/main" val="1103349925"/>
+        <p14:creationId xmlns:p14="http://schemas.microsoft.com/office/powerpoint/2010/main" val="1037686022"/>
       </p:ext>
     </p:extLst>
   </p:cSld>
@@ -4185,7 +4218,7 @@
           <p:cNvPr id="2" name="Title 1">
             <a:extLst>
               <a:ext uri="{FF2B5EF4-FFF2-40B4-BE49-F238E27FC236}">
-                <a16:creationId xmlns:a16="http://schemas.microsoft.com/office/drawing/2014/main" id="{DE31C0A8-7354-B446-BCEC-341ED8E0AA5E}"/>
+                <a16:creationId xmlns:a16="http://schemas.microsoft.com/office/drawing/2014/main" id="{98C91ED6-D288-8846-8722-99BEDCA15A40}"/>
               </a:ext>
             </a:extLst>
           </p:cNvPr>
@@ -4203,7 +4236,7 @@
           <a:p>
             <a:r>
               <a:rPr lang="en-US" dirty="0"/>
-              <a:t>Buttons</a:t>
+              <a:t>Forms</a:t>
             </a:r>
           </a:p>
         </p:txBody>
@@ -4213,7 +4246,7 @@
           <p:cNvPr id="3" name="Content Placeholder 2">
             <a:extLst>
               <a:ext uri="{FF2B5EF4-FFF2-40B4-BE49-F238E27FC236}">
-                <a16:creationId xmlns:a16="http://schemas.microsoft.com/office/drawing/2014/main" id="{DDE47306-5692-424C-9EE0-9AEB3CA7A75E}"/>
+                <a16:creationId xmlns:a16="http://schemas.microsoft.com/office/drawing/2014/main" id="{67F659D4-5B3E-F14F-844F-08CF4A03F689}"/>
               </a:ext>
             </a:extLst>
           </p:cNvPr>
@@ -4231,171 +4264,155 @@
           <a:p>
             <a:r>
               <a:rPr lang="en-US" dirty="0"/>
-              <a:t>Default Buttons: </a:t>
+              <a:t>Default forms: </a:t>
+            </a:r>
+            <a:r>
+              <a:rPr lang="en-US" sz="2400" dirty="0" err="1">
+                <a:latin typeface="Consolas" panose="020B0609020204030204" pitchFamily="49" charset="0"/>
+                <a:cs typeface="Consolas" panose="020B0609020204030204" pitchFamily="49" charset="0"/>
+              </a:rPr>
+              <a:t>form.pure</a:t>
+            </a:r>
+            <a:r>
+              <a:rPr lang="en-US" sz="2400" dirty="0">
+                <a:latin typeface="Consolas" panose="020B0609020204030204" pitchFamily="49" charset="0"/>
+                <a:cs typeface="Consolas" panose="020B0609020204030204" pitchFamily="49" charset="0"/>
+              </a:rPr>
+              <a:t>-form</a:t>
+            </a:r>
+          </a:p>
+          <a:p>
+            <a:r>
+              <a:rPr lang="en-US" dirty="0"/>
+              <a:t>Stacked: </a:t>
+            </a:r>
+            <a:r>
+              <a:rPr lang="en-US" sz="2400" dirty="0" err="1">
+                <a:latin typeface="Consolas" panose="020B0609020204030204" pitchFamily="49" charset="0"/>
+                <a:cs typeface="Consolas" panose="020B0609020204030204" pitchFamily="49" charset="0"/>
+              </a:rPr>
+              <a:t>form.pure</a:t>
+            </a:r>
+            <a:r>
+              <a:rPr lang="en-US" sz="2400" dirty="0">
+                <a:latin typeface="Consolas" panose="020B0609020204030204" pitchFamily="49" charset="0"/>
+                <a:cs typeface="Consolas" panose="020B0609020204030204" pitchFamily="49" charset="0"/>
+              </a:rPr>
+              <a:t>-</a:t>
+            </a:r>
+            <a:r>
+              <a:rPr lang="en-US" sz="2400" dirty="0" err="1">
+                <a:latin typeface="Consolas" panose="020B0609020204030204" pitchFamily="49" charset="0"/>
+                <a:cs typeface="Consolas" panose="020B0609020204030204" pitchFamily="49" charset="0"/>
+              </a:rPr>
+              <a:t>form.pure</a:t>
+            </a:r>
+            <a:r>
+              <a:rPr lang="en-US" sz="2400" dirty="0">
+                <a:latin typeface="Consolas" panose="020B0609020204030204" pitchFamily="49" charset="0"/>
+                <a:cs typeface="Consolas" panose="020B0609020204030204" pitchFamily="49" charset="0"/>
+              </a:rPr>
+              <a:t>-form-stacked</a:t>
+            </a:r>
+          </a:p>
+          <a:p>
+            <a:r>
+              <a:rPr lang="en-US" dirty="0"/>
+              <a:t>Aligned: </a:t>
+            </a:r>
+            <a:r>
+              <a:rPr lang="en-US" sz="2400" dirty="0" err="1">
+                <a:latin typeface="Consolas" panose="020B0609020204030204" pitchFamily="49" charset="0"/>
+                <a:cs typeface="Consolas" panose="020B0609020204030204" pitchFamily="49" charset="0"/>
+              </a:rPr>
+              <a:t>form.pure</a:t>
+            </a:r>
+            <a:r>
+              <a:rPr lang="en-US" sz="2400" dirty="0">
+                <a:latin typeface="Consolas" panose="020B0609020204030204" pitchFamily="49" charset="0"/>
+                <a:cs typeface="Consolas" panose="020B0609020204030204" pitchFamily="49" charset="0"/>
+              </a:rPr>
+              <a:t>-</a:t>
+            </a:r>
+            <a:r>
+              <a:rPr lang="en-US" sz="2400" dirty="0" err="1">
+                <a:latin typeface="Consolas" panose="020B0609020204030204" pitchFamily="49" charset="0"/>
+                <a:cs typeface="Consolas" panose="020B0609020204030204" pitchFamily="49" charset="0"/>
+              </a:rPr>
+              <a:t>form.pure</a:t>
+            </a:r>
+            <a:r>
+              <a:rPr lang="en-US" sz="2400" dirty="0">
+                <a:latin typeface="Consolas" panose="020B0609020204030204" pitchFamily="49" charset="0"/>
+                <a:cs typeface="Consolas" panose="020B0609020204030204" pitchFamily="49" charset="0"/>
+              </a:rPr>
+              <a:t>-form-aligned, pure-control-group</a:t>
+            </a:r>
+          </a:p>
+          <a:p>
+            <a:r>
+              <a:rPr lang="en-US" dirty="0"/>
+              <a:t>Grouped inputs: </a:t>
+            </a:r>
+            <a:r>
+              <a:rPr lang="en-US" sz="2400" dirty="0" err="1">
+                <a:latin typeface="Consolas" panose="020B0609020204030204" pitchFamily="49" charset="0"/>
+                <a:cs typeface="Consolas" panose="020B0609020204030204" pitchFamily="49" charset="0"/>
+              </a:rPr>
+              <a:t>fieldset.pure</a:t>
+            </a:r>
+            <a:r>
+              <a:rPr lang="en-US" sz="2400" dirty="0">
+                <a:latin typeface="Consolas" panose="020B0609020204030204" pitchFamily="49" charset="0"/>
+                <a:cs typeface="Consolas" panose="020B0609020204030204" pitchFamily="49" charset="0"/>
+              </a:rPr>
+              <a:t>-group</a:t>
+            </a:r>
+          </a:p>
+          <a:p>
+            <a:r>
+              <a:rPr lang="en-US" dirty="0"/>
+              <a:t>Size inputs: </a:t>
+            </a:r>
+            <a:r>
+              <a:rPr lang="en-US" sz="2400" dirty="0" err="1">
+                <a:latin typeface="Consolas" panose="020B0609020204030204" pitchFamily="49" charset="0"/>
+                <a:cs typeface="Consolas" panose="020B0609020204030204" pitchFamily="49" charset="0"/>
+              </a:rPr>
+              <a:t>input.pure</a:t>
+            </a:r>
+            <a:r>
+              <a:rPr lang="en-US" sz="2400" dirty="0">
+                <a:latin typeface="Consolas" panose="020B0609020204030204" pitchFamily="49" charset="0"/>
+                <a:cs typeface="Consolas" panose="020B0609020204030204" pitchFamily="49" charset="0"/>
+              </a:rPr>
+              <a:t>-input-*</a:t>
+            </a:r>
+          </a:p>
+          <a:p>
+            <a:r>
+              <a:rPr lang="en-US" dirty="0"/>
+              <a:t>Required: add the required attribute to the element</a:t>
+            </a:r>
+          </a:p>
+          <a:p>
+            <a:r>
+              <a:rPr lang="en-US" dirty="0"/>
+              <a:t>Disabled: add the disabled attribute to the element</a:t>
+            </a:r>
+          </a:p>
+          <a:p>
+            <a:r>
+              <a:rPr lang="en-US" dirty="0"/>
+              <a:t>Read-only: add the </a:t>
             </a:r>
             <a:r>
               <a:rPr lang="en-US" dirty="0" err="1"/>
-              <a:t>a.</a:t>
-            </a:r>
-            <a:r>
-              <a:rPr lang="en-US" sz="2400" dirty="0" err="1">
-                <a:latin typeface="Consolas" panose="020B0609020204030204" pitchFamily="49" charset="0"/>
-                <a:cs typeface="Consolas" panose="020B0609020204030204" pitchFamily="49" charset="0"/>
-              </a:rPr>
-              <a:t>pure</a:t>
-            </a:r>
-            <a:r>
-              <a:rPr lang="en-US" sz="2400" dirty="0">
-                <a:latin typeface="Consolas" panose="020B0609020204030204" pitchFamily="49" charset="0"/>
-                <a:cs typeface="Consolas" panose="020B0609020204030204" pitchFamily="49" charset="0"/>
-              </a:rPr>
-              <a:t>-button, </a:t>
-            </a:r>
-            <a:r>
-              <a:rPr lang="en-US" sz="2400" dirty="0" err="1">
-                <a:latin typeface="Consolas" panose="020B0609020204030204" pitchFamily="49" charset="0"/>
-                <a:cs typeface="Consolas" panose="020B0609020204030204" pitchFamily="49" charset="0"/>
-              </a:rPr>
-              <a:t>button</a:t>
-            </a:r>
-            <a:r>
-              <a:rPr lang="en-US" sz="2400" dirty="0" err="1"/>
-              <a:t>.</a:t>
-            </a:r>
-            <a:r>
-              <a:rPr lang="en-US" sz="2400" dirty="0" err="1">
-                <a:latin typeface="Consolas" panose="020B0609020204030204" pitchFamily="49" charset="0"/>
-                <a:cs typeface="Consolas" panose="020B0609020204030204" pitchFamily="49" charset="0"/>
-              </a:rPr>
-              <a:t>pure</a:t>
-            </a:r>
-            <a:r>
-              <a:rPr lang="en-US" sz="2400" dirty="0">
-                <a:latin typeface="Consolas" panose="020B0609020204030204" pitchFamily="49" charset="0"/>
-                <a:cs typeface="Consolas" panose="020B0609020204030204" pitchFamily="49" charset="0"/>
-              </a:rPr>
-              <a:t>-button</a:t>
-            </a:r>
-          </a:p>
-          <a:p>
-            <a:r>
-              <a:rPr lang="en-US" dirty="0"/>
-              <a:t>Disabled: </a:t>
-            </a:r>
-            <a:r>
-              <a:rPr lang="en-US" sz="2400" dirty="0"/>
-              <a:t>.</a:t>
-            </a:r>
-            <a:r>
-              <a:rPr lang="en-US" sz="2400" dirty="0">
-                <a:latin typeface="Consolas" panose="020B0609020204030204" pitchFamily="49" charset="0"/>
-                <a:cs typeface="Consolas" panose="020B0609020204030204" pitchFamily="49" charset="0"/>
-              </a:rPr>
-              <a:t>pure-</a:t>
-            </a:r>
-            <a:r>
-              <a:rPr lang="en-US" sz="2400" dirty="0" err="1">
-                <a:latin typeface="Consolas" panose="020B0609020204030204" pitchFamily="49" charset="0"/>
-                <a:cs typeface="Consolas" panose="020B0609020204030204" pitchFamily="49" charset="0"/>
-              </a:rPr>
-              <a:t>button.pure</a:t>
-            </a:r>
-            <a:r>
-              <a:rPr lang="en-US" sz="2400" dirty="0">
-                <a:latin typeface="Consolas" panose="020B0609020204030204" pitchFamily="49" charset="0"/>
-                <a:cs typeface="Consolas" panose="020B0609020204030204" pitchFamily="49" charset="0"/>
-              </a:rPr>
-              <a:t>-button-disabled</a:t>
-            </a:r>
-          </a:p>
-          <a:p>
-            <a:r>
-              <a:rPr lang="en-US" dirty="0"/>
-              <a:t>Active: </a:t>
-            </a:r>
-            <a:r>
-              <a:rPr lang="en-US" sz="2400" dirty="0"/>
-              <a:t>.</a:t>
-            </a:r>
-            <a:r>
-              <a:rPr lang="en-US" sz="2400" dirty="0">
-                <a:latin typeface="Consolas" panose="020B0609020204030204" pitchFamily="49" charset="0"/>
-                <a:cs typeface="Consolas" panose="020B0609020204030204" pitchFamily="49" charset="0"/>
-              </a:rPr>
-              <a:t>pure-</a:t>
-            </a:r>
-            <a:r>
-              <a:rPr lang="en-US" sz="2400" dirty="0" err="1">
-                <a:latin typeface="Consolas" panose="020B0609020204030204" pitchFamily="49" charset="0"/>
-                <a:cs typeface="Consolas" panose="020B0609020204030204" pitchFamily="49" charset="0"/>
-              </a:rPr>
-              <a:t>button.pure</a:t>
-            </a:r>
-            <a:r>
-              <a:rPr lang="en-US" sz="2400" dirty="0">
-                <a:latin typeface="Consolas" panose="020B0609020204030204" pitchFamily="49" charset="0"/>
-                <a:cs typeface="Consolas" panose="020B0609020204030204" pitchFamily="49" charset="0"/>
-              </a:rPr>
-              <a:t>-button-active</a:t>
-            </a:r>
-          </a:p>
-          <a:p>
-            <a:r>
-              <a:rPr lang="en-US" dirty="0"/>
-              <a:t>Primary: </a:t>
-            </a:r>
-            <a:r>
-              <a:rPr lang="en-US" sz="2400" dirty="0"/>
-              <a:t>.</a:t>
-            </a:r>
-            <a:r>
-              <a:rPr lang="en-US" sz="2400" dirty="0">
-                <a:latin typeface="Consolas" panose="020B0609020204030204" pitchFamily="49" charset="0"/>
-                <a:cs typeface="Consolas" panose="020B0609020204030204" pitchFamily="49" charset="0"/>
-              </a:rPr>
-              <a:t>pure-</a:t>
-            </a:r>
-            <a:r>
-              <a:rPr lang="en-US" sz="2400" dirty="0" err="1">
-                <a:latin typeface="Consolas" panose="020B0609020204030204" pitchFamily="49" charset="0"/>
-                <a:cs typeface="Consolas" panose="020B0609020204030204" pitchFamily="49" charset="0"/>
-              </a:rPr>
-              <a:t>button.pure</a:t>
-            </a:r>
-            <a:r>
-              <a:rPr lang="en-US" sz="2400" dirty="0">
-                <a:latin typeface="Consolas" panose="020B0609020204030204" pitchFamily="49" charset="0"/>
-                <a:cs typeface="Consolas" panose="020B0609020204030204" pitchFamily="49" charset="0"/>
-              </a:rPr>
-              <a:t>-button-primary</a:t>
-            </a:r>
-          </a:p>
-          <a:p>
-            <a:r>
-              <a:rPr lang="en-US" dirty="0"/>
-              <a:t>Grouped: </a:t>
-            </a:r>
-            <a:r>
-              <a:rPr lang="en-US" dirty="0" err="1"/>
-              <a:t>div</a:t>
-            </a:r>
-            <a:r>
-              <a:rPr lang="en-US" sz="2400" dirty="0" err="1"/>
-              <a:t>.</a:t>
-            </a:r>
-            <a:r>
-              <a:rPr lang="en-US" sz="2400" dirty="0" err="1">
-                <a:latin typeface="Consolas" panose="020B0609020204030204" pitchFamily="49" charset="0"/>
-                <a:cs typeface="Consolas" panose="020B0609020204030204" pitchFamily="49" charset="0"/>
-              </a:rPr>
-              <a:t>pure</a:t>
-            </a:r>
-            <a:r>
-              <a:rPr lang="en-US" sz="2400" dirty="0">
-                <a:latin typeface="Consolas" panose="020B0609020204030204" pitchFamily="49" charset="0"/>
-                <a:cs typeface="Consolas" panose="020B0609020204030204" pitchFamily="49" charset="0"/>
-              </a:rPr>
-              <a:t>-button-group</a:t>
+              <a:t>readonly</a:t>
+            </a:r>
+            <a:r>
+              <a:rPr lang="en-US" dirty="0"/>
+              <a:t> attribute to the element</a:t>
             </a:r>
           </a:p>
         </p:txBody>
@@ -4403,7 +4420,7 @@
     </p:spTree>
     <p:extLst>
       <p:ext uri="{BB962C8B-B14F-4D97-AF65-F5344CB8AC3E}">
-        <p14:creationId xmlns:p14="http://schemas.microsoft.com/office/powerpoint/2010/main" val="3646822575"/>
+        <p14:creationId xmlns:p14="http://schemas.microsoft.com/office/powerpoint/2010/main" val="1103349925"/>
       </p:ext>
     </p:extLst>
   </p:cSld>
@@ -4435,7 +4452,7 @@
           <p:cNvPr id="2" name="Title 1">
             <a:extLst>
               <a:ext uri="{FF2B5EF4-FFF2-40B4-BE49-F238E27FC236}">
-                <a16:creationId xmlns:a16="http://schemas.microsoft.com/office/drawing/2014/main" id="{7A3A6361-0FB0-184A-876F-4E074CB11346}"/>
+                <a16:creationId xmlns:a16="http://schemas.microsoft.com/office/drawing/2014/main" id="{DE31C0A8-7354-B446-BCEC-341ED8E0AA5E}"/>
               </a:ext>
             </a:extLst>
           </p:cNvPr>
@@ -4453,7 +4470,7 @@
           <a:p>
             <a:r>
               <a:rPr lang="en-US" dirty="0"/>
-              <a:t>Tables</a:t>
+              <a:t>Buttons</a:t>
             </a:r>
           </a:p>
         </p:txBody>
@@ -4463,7 +4480,7 @@
           <p:cNvPr id="3" name="Content Placeholder 2">
             <a:extLst>
               <a:ext uri="{FF2B5EF4-FFF2-40B4-BE49-F238E27FC236}">
-                <a16:creationId xmlns:a16="http://schemas.microsoft.com/office/drawing/2014/main" id="{F5170470-267B-9140-85BE-1BEBB1DEDDDD}"/>
+                <a16:creationId xmlns:a16="http://schemas.microsoft.com/office/drawing/2014/main" id="{DDE47306-5692-424C-9EE0-9AEB3CA7A75E}"/>
               </a:ext>
             </a:extLst>
           </p:cNvPr>
@@ -4481,11 +4498,11 @@
           <a:p>
             <a:r>
               <a:rPr lang="en-US" dirty="0"/>
-              <a:t>Default tables: </a:t>
+              <a:t>Default Buttons: </a:t>
             </a:r>
             <a:r>
               <a:rPr lang="en-US" dirty="0" err="1"/>
-              <a:t>table.</a:t>
+              <a:t>a.</a:t>
             </a:r>
             <a:r>
               <a:rPr lang="en-US" sz="2400" dirty="0" err="1">
@@ -4499,120 +4516,161 @@
                 <a:latin typeface="Consolas" panose="020B0609020204030204" pitchFamily="49" charset="0"/>
                 <a:cs typeface="Consolas" panose="020B0609020204030204" pitchFamily="49" charset="0"/>
               </a:rPr>
-              <a:t>-table</a:t>
-            </a:r>
-          </a:p>
-          <a:p>
-            <a:r>
-              <a:rPr lang="en-US" dirty="0"/>
-              <a:t>Bordered: </a:t>
+              <a:t>-button, </a:t>
             </a:r>
             <a:r>
               <a:rPr lang="en-US" sz="2400" dirty="0" err="1">
                 <a:latin typeface="Consolas" panose="020B0609020204030204" pitchFamily="49" charset="0"/>
                 <a:cs typeface="Consolas" panose="020B0609020204030204" pitchFamily="49" charset="0"/>
               </a:rPr>
-              <a:t>table.pure</a:t>
+              <a:t>button</a:t>
+            </a:r>
+            <a:r>
+              <a:rPr lang="en-US" sz="2400" dirty="0" err="1"/>
+              <a:t>.</a:t>
+            </a:r>
+            <a:r>
+              <a:rPr lang="en-US" sz="2400" dirty="0" err="1">
+                <a:latin typeface="Consolas" panose="020B0609020204030204" pitchFamily="49" charset="0"/>
+                <a:cs typeface="Consolas" panose="020B0609020204030204" pitchFamily="49" charset="0"/>
+              </a:rPr>
+              <a:t>pure</a:t>
             </a:r>
             <a:r>
               <a:rPr lang="en-US" sz="2400" dirty="0">
                 <a:latin typeface="Consolas" panose="020B0609020204030204" pitchFamily="49" charset="0"/>
                 <a:cs typeface="Consolas" panose="020B0609020204030204" pitchFamily="49" charset="0"/>
               </a:rPr>
-              <a:t>-</a:t>
+              <a:t>-button</a:t>
+            </a:r>
+          </a:p>
+          <a:p>
+            <a:r>
+              <a:rPr lang="en-US" dirty="0"/>
+              <a:t>Disabled: </a:t>
+            </a:r>
+            <a:r>
+              <a:rPr lang="en-US" sz="2400" dirty="0"/>
+              <a:t>.</a:t>
+            </a:r>
+            <a:r>
+              <a:rPr lang="en-US" sz="2400" dirty="0">
+                <a:latin typeface="Consolas" panose="020B0609020204030204" pitchFamily="49" charset="0"/>
+                <a:cs typeface="Consolas" panose="020B0609020204030204" pitchFamily="49" charset="0"/>
+              </a:rPr>
+              <a:t>pure-</a:t>
             </a:r>
             <a:r>
               <a:rPr lang="en-US" sz="2400" dirty="0" err="1">
                 <a:latin typeface="Consolas" panose="020B0609020204030204" pitchFamily="49" charset="0"/>
                 <a:cs typeface="Consolas" panose="020B0609020204030204" pitchFamily="49" charset="0"/>
               </a:rPr>
-              <a:t>table.pure</a:t>
+              <a:t>button.pure</a:t>
             </a:r>
             <a:r>
               <a:rPr lang="en-US" sz="2400" dirty="0">
                 <a:latin typeface="Consolas" panose="020B0609020204030204" pitchFamily="49" charset="0"/>
                 <a:cs typeface="Consolas" panose="020B0609020204030204" pitchFamily="49" charset="0"/>
               </a:rPr>
-              <a:t>-table-bordered</a:t>
-            </a:r>
-          </a:p>
-          <a:p>
-            <a:r>
-              <a:rPr lang="en-US" dirty="0"/>
-              <a:t>Horizontal borders: </a:t>
+              <a:t>-button-disabled</a:t>
+            </a:r>
+          </a:p>
+          <a:p>
+            <a:r>
+              <a:rPr lang="en-US" dirty="0"/>
+              <a:t>Active: </a:t>
+            </a:r>
+            <a:r>
+              <a:rPr lang="en-US" sz="2400" dirty="0"/>
+              <a:t>.</a:t>
+            </a:r>
+            <a:r>
+              <a:rPr lang="en-US" sz="2400" dirty="0">
+                <a:latin typeface="Consolas" panose="020B0609020204030204" pitchFamily="49" charset="0"/>
+                <a:cs typeface="Consolas" panose="020B0609020204030204" pitchFamily="49" charset="0"/>
+              </a:rPr>
+              <a:t>pure-</a:t>
             </a:r>
             <a:r>
               <a:rPr lang="en-US" sz="2400" dirty="0" err="1">
                 <a:latin typeface="Consolas" panose="020B0609020204030204" pitchFamily="49" charset="0"/>
                 <a:cs typeface="Consolas" panose="020B0609020204030204" pitchFamily="49" charset="0"/>
               </a:rPr>
-              <a:t>table.pure</a:t>
+              <a:t>button.pure</a:t>
             </a:r>
             <a:r>
               <a:rPr lang="en-US" sz="2400" dirty="0">
                 <a:latin typeface="Consolas" panose="020B0609020204030204" pitchFamily="49" charset="0"/>
                 <a:cs typeface="Consolas" panose="020B0609020204030204" pitchFamily="49" charset="0"/>
               </a:rPr>
-              <a:t>-</a:t>
+              <a:t>-button-active</a:t>
+            </a:r>
+          </a:p>
+          <a:p>
+            <a:r>
+              <a:rPr lang="en-US" dirty="0"/>
+              <a:t>Primary: </a:t>
+            </a:r>
+            <a:r>
+              <a:rPr lang="en-US" sz="2400" dirty="0"/>
+              <a:t>.</a:t>
+            </a:r>
+            <a:r>
+              <a:rPr lang="en-US" sz="2400" dirty="0">
+                <a:latin typeface="Consolas" panose="020B0609020204030204" pitchFamily="49" charset="0"/>
+                <a:cs typeface="Consolas" panose="020B0609020204030204" pitchFamily="49" charset="0"/>
+              </a:rPr>
+              <a:t>pure-</a:t>
             </a:r>
             <a:r>
               <a:rPr lang="en-US" sz="2400" dirty="0" err="1">
                 <a:latin typeface="Consolas" panose="020B0609020204030204" pitchFamily="49" charset="0"/>
                 <a:cs typeface="Consolas" panose="020B0609020204030204" pitchFamily="49" charset="0"/>
               </a:rPr>
-              <a:t>table.pure</a:t>
+              <a:t>button.pure</a:t>
             </a:r>
             <a:r>
               <a:rPr lang="en-US" sz="2400" dirty="0">
                 <a:latin typeface="Consolas" panose="020B0609020204030204" pitchFamily="49" charset="0"/>
                 <a:cs typeface="Consolas" panose="020B0609020204030204" pitchFamily="49" charset="0"/>
               </a:rPr>
-              <a:t>-table-horizontal</a:t>
-            </a:r>
-          </a:p>
-          <a:p>
-            <a:r>
-              <a:rPr lang="en-US" dirty="0"/>
-              <a:t>Striped: </a:t>
+              <a:t>-button-primary</a:t>
+            </a:r>
+          </a:p>
+          <a:p>
+            <a:r>
+              <a:rPr lang="en-US" dirty="0"/>
+              <a:t>Grouped: </a:t>
+            </a:r>
+            <a:r>
+              <a:rPr lang="en-US" dirty="0" err="1"/>
+              <a:t>div</a:t>
+            </a:r>
+            <a:r>
+              <a:rPr lang="en-US" sz="2400" dirty="0" err="1"/>
+              <a:t>.</a:t>
             </a:r>
             <a:r>
               <a:rPr lang="en-US" sz="2400" dirty="0" err="1">
                 <a:latin typeface="Consolas" panose="020B0609020204030204" pitchFamily="49" charset="0"/>
                 <a:cs typeface="Consolas" panose="020B0609020204030204" pitchFamily="49" charset="0"/>
               </a:rPr>
-              <a:t>table.pure</a:t>
+              <a:t>pure</a:t>
             </a:r>
             <a:r>
               <a:rPr lang="en-US" sz="2400" dirty="0">
                 <a:latin typeface="Consolas" panose="020B0609020204030204" pitchFamily="49" charset="0"/>
                 <a:cs typeface="Consolas" panose="020B0609020204030204" pitchFamily="49" charset="0"/>
               </a:rPr>
-              <a:t>-</a:t>
-            </a:r>
-            <a:r>
-              <a:rPr lang="en-US" sz="2400" dirty="0" err="1">
-                <a:latin typeface="Consolas" panose="020B0609020204030204" pitchFamily="49" charset="0"/>
-                <a:cs typeface="Consolas" panose="020B0609020204030204" pitchFamily="49" charset="0"/>
-              </a:rPr>
-              <a:t>table.pure</a:t>
-            </a:r>
-            <a:r>
-              <a:rPr lang="en-US" sz="2400" dirty="0">
-                <a:latin typeface="Consolas" panose="020B0609020204030204" pitchFamily="49" charset="0"/>
-                <a:cs typeface="Consolas" panose="020B0609020204030204" pitchFamily="49" charset="0"/>
-              </a:rPr>
-              <a:t>-table-striped</a:t>
-            </a:r>
-          </a:p>
-          <a:p>
-            <a:endParaRPr lang="en-US" dirty="0"/>
+              <a:t>-button-group</a:t>
+            </a:r>
           </a:p>
         </p:txBody>
       </p:sp>
     </p:spTree>
     <p:extLst>
       <p:ext uri="{BB962C8B-B14F-4D97-AF65-F5344CB8AC3E}">
-        <p14:creationId xmlns:p14="http://schemas.microsoft.com/office/powerpoint/2010/main" val="1220394970"/>
+        <p14:creationId xmlns:p14="http://schemas.microsoft.com/office/powerpoint/2010/main" val="3646822575"/>
       </p:ext>
     </p:extLst>
   </p:cSld>
@@ -4644,7 +4702,7 @@
           <p:cNvPr id="2" name="Title 1">
             <a:extLst>
               <a:ext uri="{FF2B5EF4-FFF2-40B4-BE49-F238E27FC236}">
-                <a16:creationId xmlns:a16="http://schemas.microsoft.com/office/drawing/2014/main" id="{043FFD13-69DF-2740-84AA-8DA07A9DC346}"/>
+                <a16:creationId xmlns:a16="http://schemas.microsoft.com/office/drawing/2014/main" id="{7A3A6361-0FB0-184A-876F-4E074CB11346}"/>
               </a:ext>
             </a:extLst>
           </p:cNvPr>
@@ -4662,7 +4720,7 @@
           <a:p>
             <a:r>
               <a:rPr lang="en-US" dirty="0"/>
-              <a:t>Menus</a:t>
+              <a:t>Tables</a:t>
             </a:r>
           </a:p>
         </p:txBody>
@@ -4672,7 +4730,7 @@
           <p:cNvPr id="3" name="Content Placeholder 2">
             <a:extLst>
               <a:ext uri="{FF2B5EF4-FFF2-40B4-BE49-F238E27FC236}">
-                <a16:creationId xmlns:a16="http://schemas.microsoft.com/office/drawing/2014/main" id="{B2A14A99-F678-9D42-BE91-73BCDF2B017F}"/>
+                <a16:creationId xmlns:a16="http://schemas.microsoft.com/office/drawing/2014/main" id="{F5170470-267B-9140-85BE-1BEBB1DEDDDD}"/>
               </a:ext>
             </a:extLst>
           </p:cNvPr>
@@ -4690,170 +4748,138 @@
           <a:p>
             <a:r>
               <a:rPr lang="en-US" dirty="0"/>
-              <a:t>Vertical (default) menus: </a:t>
+              <a:t>Default tables: </a:t>
+            </a:r>
+            <a:r>
+              <a:rPr lang="en-US" dirty="0" err="1"/>
+              <a:t>table.</a:t>
+            </a:r>
+            <a:r>
+              <a:rPr lang="en-US" sz="2400" dirty="0" err="1">
+                <a:latin typeface="Consolas" panose="020B0609020204030204" pitchFamily="49" charset="0"/>
+                <a:cs typeface="Consolas" panose="020B0609020204030204" pitchFamily="49" charset="0"/>
+              </a:rPr>
+              <a:t>pure</a:t>
             </a:r>
             <a:r>
               <a:rPr lang="en-US" sz="2400" dirty="0">
                 <a:latin typeface="Consolas" panose="020B0609020204030204" pitchFamily="49" charset="0"/>
                 <a:cs typeface="Consolas" panose="020B0609020204030204" pitchFamily="49" charset="0"/>
               </a:rPr>
-              <a:t>pure-menu, pure-menu-heading, </a:t>
+              <a:t>-table</a:t>
+            </a:r>
+          </a:p>
+          <a:p>
+            <a:r>
+              <a:rPr lang="en-US" dirty="0"/>
+              <a:t>Bordered: </a:t>
             </a:r>
             <a:r>
               <a:rPr lang="en-US" sz="2400" dirty="0" err="1">
                 <a:latin typeface="Consolas" panose="020B0609020204030204" pitchFamily="49" charset="0"/>
                 <a:cs typeface="Consolas" panose="020B0609020204030204" pitchFamily="49" charset="0"/>
               </a:rPr>
-              <a:t>ul.pure</a:t>
+              <a:t>table.pure</a:t>
             </a:r>
             <a:r>
               <a:rPr lang="en-US" sz="2400" dirty="0">
                 <a:latin typeface="Consolas" panose="020B0609020204030204" pitchFamily="49" charset="0"/>
                 <a:cs typeface="Consolas" panose="020B0609020204030204" pitchFamily="49" charset="0"/>
               </a:rPr>
-              <a:t>-menu-list, </a:t>
+              <a:t>-</a:t>
             </a:r>
             <a:r>
               <a:rPr lang="en-US" sz="2400" dirty="0" err="1">
                 <a:latin typeface="Consolas" panose="020B0609020204030204" pitchFamily="49" charset="0"/>
                 <a:cs typeface="Consolas" panose="020B0609020204030204" pitchFamily="49" charset="0"/>
               </a:rPr>
-              <a:t>li.pure</a:t>
+              <a:t>table.pure</a:t>
             </a:r>
             <a:r>
               <a:rPr lang="en-US" sz="2400" dirty="0">
                 <a:latin typeface="Consolas" panose="020B0609020204030204" pitchFamily="49" charset="0"/>
                 <a:cs typeface="Consolas" panose="020B0609020204030204" pitchFamily="49" charset="0"/>
               </a:rPr>
-              <a:t>-menu-item</a:t>
-            </a:r>
-          </a:p>
-          <a:p>
-            <a:r>
-              <a:rPr lang="en-US" dirty="0"/>
-              <a:t>Horizontal: </a:t>
+              <a:t>-table-bordered</a:t>
+            </a:r>
+          </a:p>
+          <a:p>
+            <a:r>
+              <a:rPr lang="en-US" dirty="0"/>
+              <a:t>Horizontal borders: </a:t>
+            </a:r>
+            <a:r>
+              <a:rPr lang="en-US" sz="2400" dirty="0" err="1">
+                <a:latin typeface="Consolas" panose="020B0609020204030204" pitchFamily="49" charset="0"/>
+                <a:cs typeface="Consolas" panose="020B0609020204030204" pitchFamily="49" charset="0"/>
+              </a:rPr>
+              <a:t>table.pure</a:t>
             </a:r>
             <a:r>
               <a:rPr lang="en-US" sz="2400" dirty="0">
                 <a:latin typeface="Consolas" panose="020B0609020204030204" pitchFamily="49" charset="0"/>
                 <a:cs typeface="Consolas" panose="020B0609020204030204" pitchFamily="49" charset="0"/>
               </a:rPr>
-              <a:t>pure-menu-horizontal</a:t>
-            </a:r>
-          </a:p>
-          <a:p>
-            <a:r>
-              <a:rPr lang="en-US" dirty="0"/>
-              <a:t>Selected: </a:t>
+              <a:t>-</a:t>
+            </a:r>
+            <a:r>
+              <a:rPr lang="en-US" sz="2400" dirty="0" err="1">
+                <a:latin typeface="Consolas" panose="020B0609020204030204" pitchFamily="49" charset="0"/>
+                <a:cs typeface="Consolas" panose="020B0609020204030204" pitchFamily="49" charset="0"/>
+              </a:rPr>
+              <a:t>table.pure</a:t>
             </a:r>
             <a:r>
               <a:rPr lang="en-US" sz="2400" dirty="0">
                 <a:latin typeface="Consolas" panose="020B0609020204030204" pitchFamily="49" charset="0"/>
                 <a:cs typeface="Consolas" panose="020B0609020204030204" pitchFamily="49" charset="0"/>
               </a:rPr>
-              <a:t>pure-menu-selected</a:t>
-            </a:r>
-          </a:p>
-          <a:p>
-            <a:r>
-              <a:rPr lang="en-US" dirty="0"/>
-              <a:t>Disabled: </a:t>
+              <a:t>-table-horizontal</a:t>
+            </a:r>
+          </a:p>
+          <a:p>
+            <a:r>
+              <a:rPr lang="en-US" dirty="0"/>
+              <a:t>Striped: </a:t>
+            </a:r>
+            <a:r>
+              <a:rPr lang="en-US" sz="2400" dirty="0" err="1">
+                <a:latin typeface="Consolas" panose="020B0609020204030204" pitchFamily="49" charset="0"/>
+                <a:cs typeface="Consolas" panose="020B0609020204030204" pitchFamily="49" charset="0"/>
+              </a:rPr>
+              <a:t>table.pure</a:t>
             </a:r>
             <a:r>
               <a:rPr lang="en-US" sz="2400" dirty="0">
                 <a:latin typeface="Consolas" panose="020B0609020204030204" pitchFamily="49" charset="0"/>
                 <a:cs typeface="Consolas" panose="020B0609020204030204" pitchFamily="49" charset="0"/>
               </a:rPr>
-              <a:t>pure-menu-disabled</a:t>
-            </a:r>
-          </a:p>
-          <a:p>
-            <a:r>
-              <a:rPr lang="en-US" dirty="0"/>
-              <a:t>Dropdowns: </a:t>
+              <a:t>-</a:t>
             </a:r>
             <a:r>
               <a:rPr lang="en-US" sz="2400" dirty="0" err="1">
                 <a:latin typeface="Consolas" panose="020B0609020204030204" pitchFamily="49" charset="0"/>
                 <a:cs typeface="Consolas" panose="020B0609020204030204" pitchFamily="49" charset="0"/>
               </a:rPr>
-              <a:t>ul.pure</a:t>
+              <a:t>table.pure</a:t>
             </a:r>
             <a:r>
               <a:rPr lang="en-US" sz="2400" dirty="0">
                 <a:latin typeface="Consolas" panose="020B0609020204030204" pitchFamily="49" charset="0"/>
                 <a:cs typeface="Consolas" panose="020B0609020204030204" pitchFamily="49" charset="0"/>
               </a:rPr>
-              <a:t>-menu-list, </a:t>
-            </a:r>
-            <a:r>
-              <a:rPr lang="en-US" sz="2400" dirty="0" err="1">
-                <a:latin typeface="Consolas" panose="020B0609020204030204" pitchFamily="49" charset="0"/>
-                <a:cs typeface="Consolas" panose="020B0609020204030204" pitchFamily="49" charset="0"/>
-              </a:rPr>
-              <a:t>li.pure</a:t>
-            </a:r>
-            <a:r>
-              <a:rPr lang="en-US" sz="2400" dirty="0">
-                <a:latin typeface="Consolas" panose="020B0609020204030204" pitchFamily="49" charset="0"/>
-                <a:cs typeface="Consolas" panose="020B0609020204030204" pitchFamily="49" charset="0"/>
-              </a:rPr>
-              <a:t>-menu-item</a:t>
-            </a:r>
-          </a:p>
-          <a:p>
-            <a:r>
-              <a:rPr lang="en-US" dirty="0"/>
-              <a:t>Submenus: </a:t>
-            </a:r>
-            <a:r>
-              <a:rPr lang="en-US" sz="2400" dirty="0" err="1">
-                <a:latin typeface="Consolas" panose="020B0609020204030204" pitchFamily="49" charset="0"/>
-                <a:cs typeface="Consolas" panose="020B0609020204030204" pitchFamily="49" charset="0"/>
-              </a:rPr>
-              <a:t>li.pure</a:t>
-            </a:r>
-            <a:r>
-              <a:rPr lang="en-US" sz="2400" dirty="0">
-                <a:latin typeface="Consolas" panose="020B0609020204030204" pitchFamily="49" charset="0"/>
-                <a:cs typeface="Consolas" panose="020B0609020204030204" pitchFamily="49" charset="0"/>
-              </a:rPr>
-              <a:t>-menu-has-children, </a:t>
-            </a:r>
-            <a:r>
-              <a:rPr lang="en-US" sz="2400" dirty="0" err="1">
-                <a:latin typeface="Consolas" panose="020B0609020204030204" pitchFamily="49" charset="0"/>
-                <a:cs typeface="Consolas" panose="020B0609020204030204" pitchFamily="49" charset="0"/>
-              </a:rPr>
-              <a:t>ul.pure</a:t>
-            </a:r>
-            <a:r>
-              <a:rPr lang="en-US" sz="2400" dirty="0">
-                <a:latin typeface="Consolas" panose="020B0609020204030204" pitchFamily="49" charset="0"/>
-                <a:cs typeface="Consolas" panose="020B0609020204030204" pitchFamily="49" charset="0"/>
-              </a:rPr>
-              <a:t>-menu-children</a:t>
-            </a:r>
-          </a:p>
-          <a:p>
-            <a:r>
-              <a:rPr lang="en-US" dirty="0"/>
-              <a:t>Scrollable horizontal &amp; vertical: </a:t>
-            </a:r>
-            <a:r>
-              <a:rPr lang="en-US" sz="2400" dirty="0">
-                <a:latin typeface="Consolas" panose="020B0609020204030204" pitchFamily="49" charset="0"/>
-                <a:cs typeface="Consolas" panose="020B0609020204030204" pitchFamily="49" charset="0"/>
-              </a:rPr>
-              <a:t>pure-menu-scrollable</a:t>
-            </a:r>
+              <a:t>-table-striped</a:t>
+            </a:r>
+          </a:p>
+          <a:p>
+            <a:endParaRPr lang="en-US" dirty="0"/>
           </a:p>
         </p:txBody>
       </p:sp>
     </p:spTree>
     <p:extLst>
       <p:ext uri="{BB962C8B-B14F-4D97-AF65-F5344CB8AC3E}">
-        <p14:creationId xmlns:p14="http://schemas.microsoft.com/office/powerpoint/2010/main" val="1304859677"/>
+        <p14:creationId xmlns:p14="http://schemas.microsoft.com/office/powerpoint/2010/main" val="1220394970"/>
       </p:ext>
     </p:extLst>
   </p:cSld>
@@ -4885,7 +4911,7 @@
           <p:cNvPr id="2" name="Title 1">
             <a:extLst>
               <a:ext uri="{FF2B5EF4-FFF2-40B4-BE49-F238E27FC236}">
-                <a16:creationId xmlns:a16="http://schemas.microsoft.com/office/drawing/2014/main" id="{6859FF66-1696-3047-9E70-47E82CF971C6}"/>
+                <a16:creationId xmlns:a16="http://schemas.microsoft.com/office/drawing/2014/main" id="{043FFD13-69DF-2740-84AA-8DA07A9DC346}"/>
               </a:ext>
             </a:extLst>
           </p:cNvPr>
@@ -4903,7 +4929,7 @@
           <a:p>
             <a:r>
               <a:rPr lang="en-US" dirty="0"/>
-              <a:t>Pros and Cons</a:t>
+              <a:t>Menus</a:t>
             </a:r>
           </a:p>
         </p:txBody>
@@ -4913,7 +4939,7 @@
           <p:cNvPr id="3" name="Content Placeholder 2">
             <a:extLst>
               <a:ext uri="{FF2B5EF4-FFF2-40B4-BE49-F238E27FC236}">
-                <a16:creationId xmlns:a16="http://schemas.microsoft.com/office/drawing/2014/main" id="{82707A08-4548-1949-A67F-4D5F8E3F8256}"/>
+                <a16:creationId xmlns:a16="http://schemas.microsoft.com/office/drawing/2014/main" id="{B2A14A99-F678-9D42-BE91-73BCDF2B017F}"/>
               </a:ext>
             </a:extLst>
           </p:cNvPr>
@@ -4931,49 +4957,162 @@
           <a:p>
             <a:r>
               <a:rPr lang="en-US" dirty="0"/>
-              <a:t>Pros:</a:t>
-            </a:r>
-          </a:p>
-          <a:p>
-            <a:pPr lvl="1"/>
-            <a:r>
-              <a:rPr lang="en-US" dirty="0"/>
-              <a:t>Very small footprint</a:t>
-            </a:r>
-          </a:p>
-          <a:p>
-            <a:pPr lvl="1"/>
-            <a:r>
-              <a:rPr lang="en-US" dirty="0"/>
-              <a:t>Easily extended</a:t>
-            </a:r>
-          </a:p>
-          <a:p>
-            <a:pPr lvl="1"/>
-            <a:r>
-              <a:rPr lang="en-US" dirty="0"/>
-              <a:t>Can be installed with </a:t>
-            </a:r>
-            <a:r>
-              <a:rPr lang="en-US" dirty="0" err="1"/>
-              <a:t>npm</a:t>
-            </a:r>
-            <a:r>
-              <a:rPr lang="en-US" dirty="0"/>
-              <a:t>, bower, composure, or downloaded from a CDN</a:t>
-            </a:r>
-          </a:p>
-          <a:p>
-            <a:r>
-              <a:rPr lang="en-US" dirty="0"/>
-              <a:t>Cons:</a:t>
-            </a:r>
-          </a:p>
-          <a:p>
-            <a:pPr lvl="1"/>
-            <a:r>
-              <a:rPr lang="en-US" dirty="0"/>
-              <a:t>Fewer features compared to larger CSS frameworks</a:t>
+              <a:t>Vertical (default) menus: </a:t>
+            </a:r>
+            <a:r>
+              <a:rPr lang="en-US" sz="2400" dirty="0">
+                <a:latin typeface="Consolas" panose="020B0609020204030204" pitchFamily="49" charset="0"/>
+                <a:cs typeface="Consolas" panose="020B0609020204030204" pitchFamily="49" charset="0"/>
+              </a:rPr>
+              <a:t>pure-menu, pure-menu-heading, </a:t>
+            </a:r>
+            <a:r>
+              <a:rPr lang="en-US" sz="2400" dirty="0" err="1">
+                <a:latin typeface="Consolas" panose="020B0609020204030204" pitchFamily="49" charset="0"/>
+                <a:cs typeface="Consolas" panose="020B0609020204030204" pitchFamily="49" charset="0"/>
+              </a:rPr>
+              <a:t>ul.pure</a:t>
+            </a:r>
+            <a:r>
+              <a:rPr lang="en-US" sz="2400" dirty="0">
+                <a:latin typeface="Consolas" panose="020B0609020204030204" pitchFamily="49" charset="0"/>
+                <a:cs typeface="Consolas" panose="020B0609020204030204" pitchFamily="49" charset="0"/>
+              </a:rPr>
+              <a:t>-menu-list, </a:t>
+            </a:r>
+            <a:r>
+              <a:rPr lang="en-US" sz="2400" dirty="0" err="1">
+                <a:latin typeface="Consolas" panose="020B0609020204030204" pitchFamily="49" charset="0"/>
+                <a:cs typeface="Consolas" panose="020B0609020204030204" pitchFamily="49" charset="0"/>
+              </a:rPr>
+              <a:t>li.pure</a:t>
+            </a:r>
+            <a:r>
+              <a:rPr lang="en-US" sz="2400" dirty="0">
+                <a:latin typeface="Consolas" panose="020B0609020204030204" pitchFamily="49" charset="0"/>
+                <a:cs typeface="Consolas" panose="020B0609020204030204" pitchFamily="49" charset="0"/>
+              </a:rPr>
+              <a:t>-menu-item</a:t>
+            </a:r>
+          </a:p>
+          <a:p>
+            <a:r>
+              <a:rPr lang="en-US" dirty="0"/>
+              <a:t>Horizontal: </a:t>
+            </a:r>
+            <a:r>
+              <a:rPr lang="en-US" sz="2400" dirty="0">
+                <a:latin typeface="Consolas" panose="020B0609020204030204" pitchFamily="49" charset="0"/>
+                <a:cs typeface="Consolas" panose="020B0609020204030204" pitchFamily="49" charset="0"/>
+              </a:rPr>
+              <a:t>pure-menu-horizontal</a:t>
+            </a:r>
+          </a:p>
+          <a:p>
+            <a:r>
+              <a:rPr lang="en-US" dirty="0"/>
+              <a:t>Selected: </a:t>
+            </a:r>
+            <a:r>
+              <a:rPr lang="en-US" sz="2400" dirty="0">
+                <a:latin typeface="Consolas" panose="020B0609020204030204" pitchFamily="49" charset="0"/>
+                <a:cs typeface="Consolas" panose="020B0609020204030204" pitchFamily="49" charset="0"/>
+              </a:rPr>
+              <a:t>pure-menu-selected</a:t>
+            </a:r>
+          </a:p>
+          <a:p>
+            <a:r>
+              <a:rPr lang="en-US" dirty="0"/>
+              <a:t>Disabled: </a:t>
+            </a:r>
+            <a:r>
+              <a:rPr lang="en-US" sz="2400" dirty="0">
+                <a:latin typeface="Consolas" panose="020B0609020204030204" pitchFamily="49" charset="0"/>
+                <a:cs typeface="Consolas" panose="020B0609020204030204" pitchFamily="49" charset="0"/>
+              </a:rPr>
+              <a:t>pure-menu-disabled</a:t>
+            </a:r>
+          </a:p>
+          <a:p>
+            <a:r>
+              <a:rPr lang="en-US" dirty="0"/>
+              <a:t>Dropdowns: </a:t>
+            </a:r>
+            <a:r>
+              <a:rPr lang="en-US" sz="2400" dirty="0" err="1">
+                <a:latin typeface="Consolas" panose="020B0609020204030204" pitchFamily="49" charset="0"/>
+                <a:cs typeface="Consolas" panose="020B0609020204030204" pitchFamily="49" charset="0"/>
+              </a:rPr>
+              <a:t>ul.pure</a:t>
+            </a:r>
+            <a:r>
+              <a:rPr lang="en-US" sz="2400" dirty="0">
+                <a:latin typeface="Consolas" panose="020B0609020204030204" pitchFamily="49" charset="0"/>
+                <a:cs typeface="Consolas" panose="020B0609020204030204" pitchFamily="49" charset="0"/>
+              </a:rPr>
+              <a:t>-menu-list, </a:t>
+            </a:r>
+            <a:r>
+              <a:rPr lang="en-US" sz="2400" dirty="0" err="1">
+                <a:latin typeface="Consolas" panose="020B0609020204030204" pitchFamily="49" charset="0"/>
+                <a:cs typeface="Consolas" panose="020B0609020204030204" pitchFamily="49" charset="0"/>
+              </a:rPr>
+              <a:t>li.pure</a:t>
+            </a:r>
+            <a:r>
+              <a:rPr lang="en-US" sz="2400" dirty="0">
+                <a:latin typeface="Consolas" panose="020B0609020204030204" pitchFamily="49" charset="0"/>
+                <a:cs typeface="Consolas" panose="020B0609020204030204" pitchFamily="49" charset="0"/>
+              </a:rPr>
+              <a:t>-menu-item</a:t>
+            </a:r>
+          </a:p>
+          <a:p>
+            <a:r>
+              <a:rPr lang="en-US" dirty="0"/>
+              <a:t>Submenus: </a:t>
+            </a:r>
+            <a:r>
+              <a:rPr lang="en-US" sz="2400" dirty="0" err="1">
+                <a:latin typeface="Consolas" panose="020B0609020204030204" pitchFamily="49" charset="0"/>
+                <a:cs typeface="Consolas" panose="020B0609020204030204" pitchFamily="49" charset="0"/>
+              </a:rPr>
+              <a:t>li.pure</a:t>
+            </a:r>
+            <a:r>
+              <a:rPr lang="en-US" sz="2400" dirty="0">
+                <a:latin typeface="Consolas" panose="020B0609020204030204" pitchFamily="49" charset="0"/>
+                <a:cs typeface="Consolas" panose="020B0609020204030204" pitchFamily="49" charset="0"/>
+              </a:rPr>
+              <a:t>-menu-has-children, </a:t>
+            </a:r>
+            <a:r>
+              <a:rPr lang="en-US" sz="2400" dirty="0" err="1">
+                <a:latin typeface="Consolas" panose="020B0609020204030204" pitchFamily="49" charset="0"/>
+                <a:cs typeface="Consolas" panose="020B0609020204030204" pitchFamily="49" charset="0"/>
+              </a:rPr>
+              <a:t>ul.pure</a:t>
+            </a:r>
+            <a:r>
+              <a:rPr lang="en-US" sz="2400" dirty="0">
+                <a:latin typeface="Consolas" panose="020B0609020204030204" pitchFamily="49" charset="0"/>
+                <a:cs typeface="Consolas" panose="020B0609020204030204" pitchFamily="49" charset="0"/>
+              </a:rPr>
+              <a:t>-menu-children</a:t>
+            </a:r>
+          </a:p>
+          <a:p>
+            <a:r>
+              <a:rPr lang="en-US" dirty="0"/>
+              <a:t>Scrollable horizontal &amp; vertical: </a:t>
+            </a:r>
+            <a:r>
+              <a:rPr lang="en-US" sz="2400" dirty="0">
+                <a:latin typeface="Consolas" panose="020B0609020204030204" pitchFamily="49" charset="0"/>
+                <a:cs typeface="Consolas" panose="020B0609020204030204" pitchFamily="49" charset="0"/>
+              </a:rPr>
+              <a:t>pure-menu-scrollable</a:t>
             </a:r>
           </a:p>
         </p:txBody>
@@ -4981,7 +5120,7 @@
     </p:spTree>
     <p:extLst>
       <p:ext uri="{BB962C8B-B14F-4D97-AF65-F5344CB8AC3E}">
-        <p14:creationId xmlns:p14="http://schemas.microsoft.com/office/powerpoint/2010/main" val="2836895410"/>
+        <p14:creationId xmlns:p14="http://schemas.microsoft.com/office/powerpoint/2010/main" val="1304859677"/>
       </p:ext>
     </p:extLst>
   </p:cSld>
@@ -5013,7 +5152,7 @@
           <p:cNvPr id="2" name="Title 1">
             <a:extLst>
               <a:ext uri="{FF2B5EF4-FFF2-40B4-BE49-F238E27FC236}">
-                <a16:creationId xmlns:a16="http://schemas.microsoft.com/office/drawing/2014/main" id="{2107DA4C-FA60-814D-9141-D8A5FE2EA7A5}"/>
+                <a16:creationId xmlns:a16="http://schemas.microsoft.com/office/drawing/2014/main" id="{6859FF66-1696-3047-9E70-47E82CF971C6}"/>
               </a:ext>
             </a:extLst>
           </p:cNvPr>
@@ -5031,7 +5170,7 @@
           <a:p>
             <a:r>
               <a:rPr lang="en-US" dirty="0"/>
-              <a:t>Comparison to other frameworks</a:t>
+              <a:t>Pros and Cons</a:t>
             </a:r>
           </a:p>
         </p:txBody>
@@ -5041,7 +5180,7 @@
           <p:cNvPr id="3" name="Content Placeholder 2">
             <a:extLst>
               <a:ext uri="{FF2B5EF4-FFF2-40B4-BE49-F238E27FC236}">
-                <a16:creationId xmlns:a16="http://schemas.microsoft.com/office/drawing/2014/main" id="{8E3D9D20-23C0-AD40-8387-9132987B5A0D}"/>
+                <a16:creationId xmlns:a16="http://schemas.microsoft.com/office/drawing/2014/main" id="{82707A08-4548-1949-A67F-4D5F8E3F8256}"/>
               </a:ext>
             </a:extLst>
           </p:cNvPr>
@@ -5059,21 +5198,57 @@
           <a:p>
             <a:r>
               <a:rPr lang="en-US" dirty="0"/>
-              <a:t>Competes with: Bootstrap, Foundation, Cascade, Materialize</a:t>
-            </a:r>
-          </a:p>
-          <a:p>
-            <a:endParaRPr lang="en-US" dirty="0"/>
-          </a:p>
-          <a:p>
-            <a:endParaRPr lang="en-US" dirty="0"/>
+              <a:t>Pros:</a:t>
+            </a:r>
+          </a:p>
+          <a:p>
+            <a:pPr lvl="1"/>
+            <a:r>
+              <a:rPr lang="en-US" dirty="0"/>
+              <a:t>Very small footprint</a:t>
+            </a:r>
+          </a:p>
+          <a:p>
+            <a:pPr lvl="1"/>
+            <a:r>
+              <a:rPr lang="en-US" dirty="0"/>
+              <a:t>Easily extended</a:t>
+            </a:r>
+          </a:p>
+          <a:p>
+            <a:pPr lvl="1"/>
+            <a:r>
+              <a:rPr lang="en-US" dirty="0"/>
+              <a:t>Can be installed with </a:t>
+            </a:r>
+            <a:r>
+              <a:rPr lang="en-US" dirty="0" err="1"/>
+              <a:t>npm</a:t>
+            </a:r>
+            <a:r>
+              <a:rPr lang="en-US" dirty="0"/>
+              <a:t>, bower, composure, or downloaded from a CDN</a:t>
+            </a:r>
+          </a:p>
+          <a:p>
+            <a:r>
+              <a:rPr lang="en-US" dirty="0"/>
+              <a:t>Cons:</a:t>
+            </a:r>
+          </a:p>
+          <a:p>
+            <a:pPr lvl="1"/>
+            <a:r>
+              <a:rPr lang="en-US" dirty="0"/>
+              <a:t>Fewer features compared to larger CSS frameworks</a:t>
+            </a:r>
           </a:p>
         </p:txBody>
       </p:sp>
     </p:spTree>
     <p:extLst>
       <p:ext uri="{BB962C8B-B14F-4D97-AF65-F5344CB8AC3E}">
-        <p14:creationId xmlns:p14="http://schemas.microsoft.com/office/powerpoint/2010/main" val="487972692"/>
+        <p14:creationId xmlns:p14="http://schemas.microsoft.com/office/powerpoint/2010/main" val="2836895410"/>
       </p:ext>
     </p:extLst>
   </p:cSld>

</xml_diff>